<commit_message>
Version 2 des fiches
</commit_message>
<xml_diff>
--- a/01_ModelisationMultiphysique/Administratif/SCIL1_PPT.pptx
+++ b/01_ModelisationMultiphysique/Administratif/SCIL1_PPT.pptx
@@ -198,7 +198,8 @@
           <a:p>
             <a:fld id="{A2604479-CBC5-3546-8A0D-DC7D3BA30544}" type="datetimeFigureOut">
               <a:rPr lang="fr-FR" smtClean="0"/>
-              <a:t>01/12/2014</a:t>
+              <a:pPr/>
+              <a:t>06/12/2014</a:t>
             </a:fld>
             <a:endParaRPr lang="fr-FR"/>
           </a:p>
@@ -264,6 +265,7 @@
           <a:p>
             <a:fld id="{F34030A3-A5D3-C641-8CA3-9440A0A1CBC5}" type="slidenum">
               <a:rPr lang="fr-FR" smtClean="0"/>
+              <a:pPr/>
               <a:t>‹N°›</a:t>
             </a:fld>
             <a:endParaRPr lang="fr-FR"/>
@@ -273,7 +275,7 @@
     </p:spTree>
     <p:extLst>
       <p:ext uri="{BB962C8B-B14F-4D97-AF65-F5344CB8AC3E}">
-        <p14:creationId xmlns:p14="http://schemas.microsoft.com/office/powerpoint/2010/main" val="3414476341"/>
+        <p14:creationId xmlns:p14="http://schemas.microsoft.com/office/powerpoint/2010/main" xmlns="" val="3414476341"/>
       </p:ext>
     </p:extLst>
   </p:cSld>
@@ -364,7 +366,8 @@
           <a:p>
             <a:fld id="{7F4FFA02-BD9A-5445-8E51-E6D5A4E1DD4B}" type="datetimeFigureOut">
               <a:rPr lang="fr-FR" smtClean="0"/>
-              <a:t>01/12/2014</a:t>
+              <a:pPr/>
+              <a:t>06/12/2014</a:t>
             </a:fld>
             <a:endParaRPr lang="fr-FR"/>
           </a:p>
@@ -523,6 +526,7 @@
           <a:p>
             <a:fld id="{D69D4C5C-07DB-4146-8BDE-61540ADB1C9B}" type="slidenum">
               <a:rPr lang="fr-FR" smtClean="0"/>
+              <a:pPr/>
               <a:t>‹N°›</a:t>
             </a:fld>
             <a:endParaRPr lang="fr-FR"/>
@@ -532,7 +536,7 @@
     </p:spTree>
     <p:extLst>
       <p:ext uri="{BB962C8B-B14F-4D97-AF65-F5344CB8AC3E}">
-        <p14:creationId xmlns:p14="http://schemas.microsoft.com/office/powerpoint/2010/main" val="401334093"/>
+        <p14:creationId xmlns:p14="http://schemas.microsoft.com/office/powerpoint/2010/main" xmlns="" val="401334093"/>
       </p:ext>
     </p:extLst>
   </p:cSld>
@@ -683,11 +687,7 @@
             </a:r>
             <a:r>
               <a:rPr lang="fr-FR" baseline="0" dirty="0" smtClean="0"/>
-              <a:t> formation d’une journée propose </a:t>
-            </a:r>
-            <a:r>
-              <a:rPr lang="fr-FR" baseline="0" dirty="0" smtClean="0"/>
-              <a:t>de découvrir la modélisation multiphysique en s’appuyant sur le logiciel Scilab ainsi que son module XCOS.</a:t>
+              <a:t> formation d’une journée propose de découvrir la modélisation multiphysique en s’appuyant sur le logiciel Scilab ainsi que son module XCOS.</a:t>
             </a:r>
           </a:p>
           <a:p>
@@ -712,6 +712,7 @@
           <a:p>
             <a:fld id="{D69D4C5C-07DB-4146-8BDE-61540ADB1C9B}" type="slidenum">
               <a:rPr lang="fr-FR" smtClean="0"/>
+              <a:pPr/>
               <a:t>1</a:t>
             </a:fld>
             <a:endParaRPr lang="fr-FR"/>
@@ -721,7 +722,7 @@
     </p:spTree>
     <p:extLst>
       <p:ext uri="{BB962C8B-B14F-4D97-AF65-F5344CB8AC3E}">
-        <p14:creationId xmlns:p14="http://schemas.microsoft.com/office/powerpoint/2010/main" val="2560094274"/>
+        <p14:creationId xmlns:p14="http://schemas.microsoft.com/office/powerpoint/2010/main" xmlns="" val="2560094274"/>
       </p:ext>
     </p:extLst>
   </p:cSld>
@@ -783,7 +784,23 @@
           <a:p>
             <a:r>
               <a:rPr lang="fr-FR" baseline="0" dirty="0" smtClean="0"/>
-              <a:t> - électronique et électrotechnique, mécanique, hydraulique, thermique etc.</a:t>
+              <a:t> - </a:t>
+            </a:r>
+            <a:r>
+              <a:rPr lang="fr-FR" baseline="0" dirty="0" smtClean="0"/>
+              <a:t>électrique, électrotechnique</a:t>
+            </a:r>
+            <a:r>
+              <a:rPr lang="fr-FR" baseline="0" dirty="0" smtClean="0"/>
+              <a:t>, </a:t>
+            </a:r>
+            <a:r>
+              <a:rPr lang="fr-FR" baseline="0" dirty="0" smtClean="0"/>
+              <a:t>électronique, mécanique</a:t>
+            </a:r>
+            <a:r>
+              <a:rPr lang="fr-FR" baseline="0" dirty="0" smtClean="0"/>
+              <a:t>, hydraulique, thermique etc.</a:t>
             </a:r>
           </a:p>
           <a:p>
@@ -792,15 +809,39 @@
           <a:p>
             <a:r>
               <a:rPr lang="fr-FR" baseline="0" dirty="0" smtClean="0"/>
-              <a:t>Ainsi dans cet exemple possible de modéliser toutes les composantes d’un moteur à courant continu à savoir les parties électriques, </a:t>
-            </a:r>
-            <a:r>
-              <a:rPr lang="fr-FR" baseline="0" dirty="0" err="1" smtClean="0"/>
-              <a:t>életrotechniques</a:t>
+              <a:t>Ainsi dans cet </a:t>
             </a:r>
             <a:r>
               <a:rPr lang="fr-FR" baseline="0" dirty="0" smtClean="0"/>
-              <a:t> et mécaniques. </a:t>
+              <a:t>exemple, il est </a:t>
+            </a:r>
+            <a:r>
+              <a:rPr lang="fr-FR" baseline="0" dirty="0" smtClean="0"/>
+              <a:t>possible de modéliser </a:t>
+            </a:r>
+            <a:r>
+              <a:rPr lang="fr-FR" baseline="0" dirty="0" smtClean="0"/>
+              <a:t>un </a:t>
+            </a:r>
+            <a:r>
+              <a:rPr lang="fr-FR" baseline="0" dirty="0" smtClean="0"/>
+              <a:t>moteur à courant continu </a:t>
+            </a:r>
+            <a:r>
+              <a:rPr lang="fr-FR" baseline="0" dirty="0" smtClean="0"/>
+              <a:t>par des parties </a:t>
+            </a:r>
+            <a:r>
+              <a:rPr lang="fr-FR" baseline="0" dirty="0" smtClean="0"/>
+              <a:t>électriques, </a:t>
+            </a:r>
+            <a:r>
+              <a:rPr lang="fr-FR" baseline="0" dirty="0" smtClean="0"/>
+              <a:t>électrotechniques </a:t>
+            </a:r>
+            <a:r>
+              <a:rPr lang="fr-FR" baseline="0" dirty="0" smtClean="0"/>
+              <a:t>et mécaniques. </a:t>
             </a:r>
           </a:p>
           <a:p>
@@ -831,6 +872,7 @@
           <a:p>
             <a:fld id="{D69D4C5C-07DB-4146-8BDE-61540ADB1C9B}" type="slidenum">
               <a:rPr lang="fr-FR" smtClean="0"/>
+              <a:pPr/>
               <a:t>2</a:t>
             </a:fld>
             <a:endParaRPr lang="fr-FR"/>
@@ -840,7 +882,7 @@
     </p:spTree>
     <p:extLst>
       <p:ext uri="{BB962C8B-B14F-4D97-AF65-F5344CB8AC3E}">
-        <p14:creationId xmlns:p14="http://schemas.microsoft.com/office/powerpoint/2010/main" val="3804525864"/>
+        <p14:creationId xmlns:p14="http://schemas.microsoft.com/office/powerpoint/2010/main" xmlns="" val="3804525864"/>
       </p:ext>
     </p:extLst>
   </p:cSld>
@@ -916,7 +958,19 @@
             </a:r>
             <a:r>
               <a:rPr lang="fr-FR" baseline="0" dirty="0" smtClean="0"/>
-              <a:t> car en terme de modélisation des systèmes multiphysique, il est en adéquation avec les besoins des programmes des filières SSI et STI2D. </a:t>
+              <a:t> car en terme de modélisation des systèmes </a:t>
+            </a:r>
+            <a:r>
+              <a:rPr lang="fr-FR" baseline="0" dirty="0" err="1" smtClean="0"/>
+              <a:t>multiphysiques</a:t>
+            </a:r>
+            <a:r>
+              <a:rPr lang="fr-FR" baseline="0" dirty="0" smtClean="0"/>
+              <a:t>, </a:t>
+            </a:r>
+            <a:r>
+              <a:rPr lang="fr-FR" baseline="0" dirty="0" smtClean="0"/>
+              <a:t>il est en adéquation avec les besoins des programmes des filières SSI et STI2D. </a:t>
             </a:r>
           </a:p>
           <a:p>
@@ -926,7 +980,7 @@
             </a:r>
             <a:r>
               <a:rPr lang="fr-FR" baseline="0" dirty="0" err="1" smtClean="0"/>
-              <a:t>xcos</a:t>
+              <a:t>Xcos</a:t>
             </a:r>
             <a:r>
               <a:rPr lang="fr-FR" baseline="0" dirty="0" smtClean="0"/>
@@ -964,6 +1018,7 @@
           <a:p>
             <a:fld id="{D69D4C5C-07DB-4146-8BDE-61540ADB1C9B}" type="slidenum">
               <a:rPr lang="fr-FR" smtClean="0"/>
+              <a:pPr/>
               <a:t>3</a:t>
             </a:fld>
             <a:endParaRPr lang="fr-FR"/>
@@ -973,7 +1028,7 @@
     </p:spTree>
     <p:extLst>
       <p:ext uri="{BB962C8B-B14F-4D97-AF65-F5344CB8AC3E}">
-        <p14:creationId xmlns:p14="http://schemas.microsoft.com/office/powerpoint/2010/main" val="1028214212"/>
+        <p14:creationId xmlns:p14="http://schemas.microsoft.com/office/powerpoint/2010/main" xmlns="" val="1028214212"/>
       </p:ext>
     </p:extLst>
   </p:cSld>
@@ -1066,6 +1121,7 @@
           <a:p>
             <a:fld id="{D69D4C5C-07DB-4146-8BDE-61540ADB1C9B}" type="slidenum">
               <a:rPr lang="fr-FR" smtClean="0"/>
+              <a:pPr/>
               <a:t>4</a:t>
             </a:fld>
             <a:endParaRPr lang="fr-FR"/>
@@ -1075,7 +1131,7 @@
     </p:spTree>
     <p:extLst>
       <p:ext uri="{BB962C8B-B14F-4D97-AF65-F5344CB8AC3E}">
-        <p14:creationId xmlns:p14="http://schemas.microsoft.com/office/powerpoint/2010/main" val="1495809067"/>
+        <p14:creationId xmlns:p14="http://schemas.microsoft.com/office/powerpoint/2010/main" xmlns="" val="1495809067"/>
       </p:ext>
     </p:extLst>
   </p:cSld>
@@ -1273,7 +1329,8 @@
           <a:p>
             <a:fld id="{6709E43B-9441-6341-BD63-84DDA1A9C3FB}" type="datetime1">
               <a:rPr lang="fr-FR" smtClean="0"/>
-              <a:t>01/12/2014</a:t>
+              <a:pPr/>
+              <a:t>06/12/2014</a:t>
             </a:fld>
             <a:endParaRPr lang="fr-FR"/>
           </a:p>
@@ -1319,6 +1376,7 @@
           <a:p>
             <a:fld id="{5FD889E0-CAB2-4699-909D-B9A88D47ACBE}" type="slidenum">
               <a:rPr lang="en-US" smtClean="0"/>
+              <a:pPr/>
               <a:t>‹N°›</a:t>
             </a:fld>
             <a:endParaRPr lang="en-US"/>
@@ -1477,7 +1535,8 @@
           <a:p>
             <a:fld id="{268AA955-8B04-894F-8FDF-A5E12E980EDC}" type="datetime1">
               <a:rPr lang="fr-FR" smtClean="0"/>
-              <a:t>01/12/2014</a:t>
+              <a:pPr/>
+              <a:t>06/12/2014</a:t>
             </a:fld>
             <a:endParaRPr lang="fr-FR"/>
           </a:p>
@@ -1523,6 +1582,7 @@
           <a:p>
             <a:fld id="{9B8334CA-52B9-8B4B-AA0F-E9B48CBEA1E4}" type="slidenum">
               <a:rPr lang="fr-FR" smtClean="0"/>
+              <a:pPr/>
               <a:t>‹N°›</a:t>
             </a:fld>
             <a:endParaRPr lang="fr-FR"/>
@@ -1656,7 +1716,8 @@
           <a:p>
             <a:fld id="{FDC97532-5F56-764F-9C75-F53758D5A21E}" type="datetime1">
               <a:rPr lang="fr-FR" smtClean="0"/>
-              <a:t>01/12/2014</a:t>
+              <a:pPr/>
+              <a:t>06/12/2014</a:t>
             </a:fld>
             <a:endParaRPr lang="fr-FR"/>
           </a:p>
@@ -1702,6 +1763,7 @@
           <a:p>
             <a:fld id="{9B8334CA-52B9-8B4B-AA0F-E9B48CBEA1E4}" type="slidenum">
               <a:rPr lang="fr-FR" smtClean="0"/>
+              <a:pPr/>
               <a:t>‹N°›</a:t>
             </a:fld>
             <a:endParaRPr lang="fr-FR"/>
@@ -1851,7 +1913,8 @@
           <a:p>
             <a:fld id="{EC050341-9FD1-4D41-897E-C16A13D412D6}" type="datetime1">
               <a:rPr lang="fr-FR" smtClean="0"/>
-              <a:t>01/12/2014</a:t>
+              <a:pPr/>
+              <a:t>06/12/2014</a:t>
             </a:fld>
             <a:endParaRPr lang="fr-FR"/>
           </a:p>
@@ -1897,6 +1960,7 @@
           <a:p>
             <a:fld id="{9B8334CA-52B9-8B4B-AA0F-E9B48CBEA1E4}" type="slidenum">
               <a:rPr lang="fr-FR" smtClean="0"/>
+              <a:pPr/>
               <a:t>‹N°›</a:t>
             </a:fld>
             <a:endParaRPr lang="fr-FR"/>
@@ -2110,7 +2174,8 @@
           <a:p>
             <a:fld id="{267F1CD6-E1AD-4847-B8D2-9BC7541D26A9}" type="datetime1">
               <a:rPr lang="fr-FR" smtClean="0"/>
-              <a:t>01/12/2014</a:t>
+              <a:pPr/>
+              <a:t>06/12/2014</a:t>
             </a:fld>
             <a:endParaRPr lang="fr-FR"/>
           </a:p>
@@ -2156,6 +2221,7 @@
           <a:p>
             <a:fld id="{4A822907-8A9D-4F6B-98F6-913902AD56B5}" type="slidenum">
               <a:rPr lang="en-US" smtClean="0"/>
+              <a:pPr/>
               <a:t>‹N°›</a:t>
             </a:fld>
             <a:endParaRPr lang="en-US"/>
@@ -2432,7 +2498,8 @@
           <a:p>
             <a:fld id="{377C4889-60B5-CD4F-97E2-5B317AA429BB}" type="datetime1">
               <a:rPr lang="fr-FR" smtClean="0"/>
-              <a:t>01/12/2014</a:t>
+              <a:pPr/>
+              <a:t>06/12/2014</a:t>
             </a:fld>
             <a:endParaRPr lang="fr-FR"/>
           </a:p>
@@ -2478,6 +2545,7 @@
           <a:p>
             <a:fld id="{9B8334CA-52B9-8B4B-AA0F-E9B48CBEA1E4}" type="slidenum">
               <a:rPr lang="fr-FR" smtClean="0"/>
+              <a:pPr/>
               <a:t>‹N°›</a:t>
             </a:fld>
             <a:endParaRPr lang="fr-FR"/>
@@ -2902,7 +2970,8 @@
           <a:p>
             <a:fld id="{0FA1CA9B-4F70-864C-920B-92AD8DFE7583}" type="datetime1">
               <a:rPr lang="fr-FR" smtClean="0"/>
-              <a:t>01/12/2014</a:t>
+              <a:pPr/>
+              <a:t>06/12/2014</a:t>
             </a:fld>
             <a:endParaRPr lang="fr-FR"/>
           </a:p>
@@ -2948,6 +3017,7 @@
           <a:p>
             <a:fld id="{9B8334CA-52B9-8B4B-AA0F-E9B48CBEA1E4}" type="slidenum">
               <a:rPr lang="fr-FR" smtClean="0"/>
+              <a:pPr/>
               <a:t>‹N°›</a:t>
             </a:fld>
             <a:endParaRPr lang="fr-FR"/>
@@ -3054,7 +3124,8 @@
           <a:p>
             <a:fld id="{4F2CC383-4EE0-2241-AEE6-2AAA6580B403}" type="datetime1">
               <a:rPr lang="fr-FR" smtClean="0"/>
-              <a:t>01/12/2014</a:t>
+              <a:pPr/>
+              <a:t>06/12/2014</a:t>
             </a:fld>
             <a:endParaRPr lang="fr-FR"/>
           </a:p>
@@ -3100,6 +3171,7 @@
           <a:p>
             <a:fld id="{9B8334CA-52B9-8B4B-AA0F-E9B48CBEA1E4}" type="slidenum">
               <a:rPr lang="fr-FR" smtClean="0"/>
+              <a:pPr/>
               <a:t>‹N°›</a:t>
             </a:fld>
             <a:endParaRPr lang="fr-FR"/>
@@ -3148,7 +3220,8 @@
           <a:p>
             <a:fld id="{3F29AFFA-2E38-E240-9E76-4B3B98489A6D}" type="datetime1">
               <a:rPr lang="fr-FR" smtClean="0"/>
-              <a:t>01/12/2014</a:t>
+              <a:pPr/>
+              <a:t>06/12/2014</a:t>
             </a:fld>
             <a:endParaRPr lang="fr-FR"/>
           </a:p>
@@ -3194,6 +3267,7 @@
           <a:p>
             <a:fld id="{9B8334CA-52B9-8B4B-AA0F-E9B48CBEA1E4}" type="slidenum">
               <a:rPr lang="fr-FR" smtClean="0"/>
+              <a:pPr/>
               <a:t>‹N°›</a:t>
             </a:fld>
             <a:endParaRPr lang="fr-FR"/>
@@ -3426,7 +3500,8 @@
           <a:p>
             <a:fld id="{BC66C2F2-1133-B742-8E81-ACE648734598}" type="datetime1">
               <a:rPr lang="fr-FR" smtClean="0"/>
-              <a:t>01/12/2014</a:t>
+              <a:pPr/>
+              <a:t>06/12/2014</a:t>
             </a:fld>
             <a:endParaRPr lang="fr-FR"/>
           </a:p>
@@ -3472,6 +3547,7 @@
           <a:p>
             <a:fld id="{7F5CE407-6216-4202-80E4-A30DC2F709B2}" type="slidenum">
               <a:rPr lang="en-US" smtClean="0"/>
+              <a:pPr/>
               <a:t>‹N°›</a:t>
             </a:fld>
             <a:endParaRPr lang="en-US"/>
@@ -3735,7 +3811,8 @@
           <a:p>
             <a:fld id="{7312FBEE-7E81-E746-8617-1B9234528FDD}" type="datetime1">
               <a:rPr lang="fr-FR" smtClean="0"/>
-              <a:t>01/12/2014</a:t>
+              <a:pPr/>
+              <a:t>06/12/2014</a:t>
             </a:fld>
             <a:endParaRPr lang="fr-FR"/>
           </a:p>
@@ -3781,6 +3858,7 @@
           <a:p>
             <a:fld id="{9B8334CA-52B9-8B4B-AA0F-E9B48CBEA1E4}" type="slidenum">
               <a:rPr lang="fr-FR" smtClean="0"/>
+              <a:pPr/>
               <a:t>‹N°›</a:t>
             </a:fld>
             <a:endParaRPr lang="fr-FR"/>
@@ -4037,7 +4115,8 @@
           <a:p>
             <a:fld id="{B90A4B7D-106F-C147-BCBF-57A394B22041}" type="datetime1">
               <a:rPr lang="fr-FR" smtClean="0"/>
-              <a:t>01/12/2014</a:t>
+              <a:pPr/>
+              <a:t>06/12/2014</a:t>
             </a:fld>
             <a:endParaRPr lang="fr-FR"/>
           </a:p>
@@ -4115,6 +4194,7 @@
           <a:p>
             <a:fld id="{9B8334CA-52B9-8B4B-AA0F-E9B48CBEA1E4}" type="slidenum">
               <a:rPr lang="fr-FR" smtClean="0"/>
+              <a:pPr/>
               <a:t>‹N°›</a:t>
             </a:fld>
             <a:endParaRPr lang="fr-FR"/>
@@ -4465,15 +4545,7 @@
           <a:p>
             <a:r>
               <a:rPr lang="fr-FR" sz="3600" dirty="0" smtClean="0"/>
-              <a:t>Scilab </a:t>
-            </a:r>
-            <a:r>
-              <a:rPr lang="fr-FR" sz="3600" dirty="0" smtClean="0"/>
-              <a:t>– XCOS </a:t>
-            </a:r>
-            <a:r>
-              <a:rPr lang="fr-FR" sz="3600" dirty="0" smtClean="0"/>
-              <a:t>– Niveau 1</a:t>
+              <a:t>Scilab – XCOS – Niveau 1</a:t>
             </a:r>
             <a:br>
               <a:rPr lang="fr-FR" sz="3600" dirty="0" smtClean="0"/>
@@ -4572,19 +4644,19 @@
     </p:spTree>
     <p:extLst>
       <p:ext uri="{BB962C8B-B14F-4D97-AF65-F5344CB8AC3E}">
-        <p14:creationId xmlns:p14="http://schemas.microsoft.com/office/powerpoint/2010/main" val="3037635492"/>
+        <p14:creationId xmlns:p14="http://schemas.microsoft.com/office/powerpoint/2010/main" xmlns="" val="3037635492"/>
       </p:ext>
     </p:extLst>
   </p:cSld>
   <p:clrMapOvr>
     <a:masterClrMapping/>
   </p:clrMapOvr>
-  <mc:AlternateContent xmlns:mc="http://schemas.openxmlformats.org/markup-compatibility/2006" xmlns:p14="http://schemas.microsoft.com/office/powerpoint/2010/main">
-    <mc:Choice Requires="p14">
+  <mc:AlternateContent xmlns:mc="http://schemas.openxmlformats.org/markup-compatibility/2006">
+    <mc:Choice xmlns:p14="http://schemas.microsoft.com/office/powerpoint/2010/main" xmlns="" Requires="p14">
       <p:transition spd="slow" p14:dur="2000"/>
     </mc:Choice>
-    <mc:Fallback xmlns="">
-      <p:transition xmlns:p14="http://schemas.microsoft.com/office/powerpoint/2010/main" spd="slow"/>
+    <mc:Fallback>
+      <p:transition spd="slow"/>
     </mc:Fallback>
   </mc:AlternateContent>
   <p:timing>
@@ -4674,7 +4746,7 @@
           <a:blip r:embed="rId3">
             <a:extLst>
               <a:ext uri="{28A0092B-C50C-407E-A947-70E740481C1C}">
-                <a14:useLocalDpi xmlns:a14="http://schemas.microsoft.com/office/drawing/2010/main" val="0"/>
+                <a14:useLocalDpi xmlns:a14="http://schemas.microsoft.com/office/drawing/2010/main" xmlns="" val="0"/>
               </a:ext>
             </a:extLst>
           </a:blip>
@@ -4703,14 +4775,14 @@
           </a:effectLst>
           <a:extLst>
             <a:ext uri="{909E8E84-426E-40DD-AFC4-6F175D3DCCD1}">
-              <a14:hiddenFill xmlns:a14="http://schemas.microsoft.com/office/drawing/2010/main">
+              <a14:hiddenFill xmlns:a14="http://schemas.microsoft.com/office/drawing/2010/main" xmlns="">
                 <a:solidFill>
                   <a:schemeClr val="accent1"/>
                 </a:solidFill>
               </a14:hiddenFill>
             </a:ext>
             <a:ext uri="{91240B29-F687-4F45-9708-019B960494DF}">
-              <a14:hiddenLine xmlns:a14="http://schemas.microsoft.com/office/drawing/2010/main" w="9525">
+              <a14:hiddenLine xmlns:a14="http://schemas.microsoft.com/office/drawing/2010/main" xmlns="" w="9525">
                 <a:solidFill>
                   <a:schemeClr val="tx1"/>
                 </a:solidFill>
@@ -4734,7 +4806,7 @@
           <a:blip r:embed="rId4">
             <a:extLst>
               <a:ext uri="{28A0092B-C50C-407E-A947-70E740481C1C}">
-                <a14:useLocalDpi xmlns:a14="http://schemas.microsoft.com/office/drawing/2010/main" val="0"/>
+                <a14:useLocalDpi xmlns:a14="http://schemas.microsoft.com/office/drawing/2010/main" xmlns="" val="0"/>
               </a:ext>
             </a:extLst>
           </a:blip>
@@ -4758,14 +4830,14 @@
           <a:effectLst/>
           <a:extLst>
             <a:ext uri="{909E8E84-426E-40DD-AFC4-6F175D3DCCD1}">
-              <a14:hiddenFill xmlns:a14="http://schemas.microsoft.com/office/drawing/2010/main">
+              <a14:hiddenFill xmlns:a14="http://schemas.microsoft.com/office/drawing/2010/main" xmlns="">
                 <a:solidFill>
                   <a:schemeClr val="accent1"/>
                 </a:solidFill>
               </a14:hiddenFill>
             </a:ext>
             <a:ext uri="{91240B29-F687-4F45-9708-019B960494DF}">
-              <a14:hiddenLine xmlns:a14="http://schemas.microsoft.com/office/drawing/2010/main" w="9525">
+              <a14:hiddenLine xmlns:a14="http://schemas.microsoft.com/office/drawing/2010/main" xmlns="" w="9525">
                 <a:solidFill>
                   <a:schemeClr val="tx1"/>
                 </a:solidFill>
@@ -4775,7 +4847,7 @@
               </a14:hiddenLine>
             </a:ext>
             <a:ext uri="{AF507438-7753-43E0-B8FC-AC1667EBCBE1}">
-              <a14:hiddenEffects xmlns:a14="http://schemas.microsoft.com/office/drawing/2010/main">
+              <a14:hiddenEffects xmlns:a14="http://schemas.microsoft.com/office/drawing/2010/main" xmlns="">
                 <a:effectLst>
                   <a:outerShdw dist="35921" dir="2700000" algn="ctr" rotWithShape="0">
                     <a:schemeClr val="bg2"/>
@@ -4794,8 +4866,8 @@
         </p:nvSpPr>
         <p:spPr>
           <a:xfrm>
-            <a:off x="2277445" y="1363056"/>
-            <a:ext cx="1595622" cy="2116017"/>
+            <a:off x="2149519" y="1363056"/>
+            <a:ext cx="1723547" cy="2116017"/>
           </a:xfrm>
           <a:prstGeom prst="rect">
             <a:avLst/>
@@ -4841,8 +4913,8 @@
         </p:nvSpPr>
         <p:spPr>
           <a:xfrm>
-            <a:off x="3925820" y="1363056"/>
-            <a:ext cx="822026" cy="2116017"/>
+            <a:off x="4008945" y="1363056"/>
+            <a:ext cx="966816" cy="2116017"/>
           </a:xfrm>
           <a:prstGeom prst="rect">
             <a:avLst/>
@@ -4935,8 +5007,8 @@
         </p:nvSpPr>
         <p:spPr>
           <a:xfrm>
-            <a:off x="1058245" y="3775864"/>
-            <a:ext cx="3515188" cy="2139996"/>
+            <a:off x="2149519" y="3775864"/>
+            <a:ext cx="2423914" cy="2139996"/>
           </a:xfrm>
           <a:prstGeom prst="rect">
             <a:avLst/>
@@ -4983,7 +5055,7 @@
         <p:spPr>
           <a:xfrm>
             <a:off x="4723695" y="3775864"/>
-            <a:ext cx="822026" cy="1419560"/>
+            <a:ext cx="632076" cy="2139996"/>
           </a:xfrm>
           <a:prstGeom prst="rect">
             <a:avLst/>
@@ -5029,8 +5101,8 @@
         </p:nvSpPr>
         <p:spPr>
           <a:xfrm>
-            <a:off x="5647325" y="3775864"/>
-            <a:ext cx="2617443" cy="1419560"/>
+            <a:off x="5564201" y="3775864"/>
+            <a:ext cx="694098" cy="2139996"/>
           </a:xfrm>
           <a:prstGeom prst="rect">
             <a:avLst/>
@@ -5307,8 +5379,13 @@
           <a:p>
             <a:r>
               <a:rPr lang="fr-FR" sz="1600" dirty="0" smtClean="0"/>
-              <a:t>Domaine du génie électronique</a:t>
-            </a:r>
+              <a:t>Domaine du génie </a:t>
+            </a:r>
+            <a:r>
+              <a:rPr lang="fr-FR" sz="1600" dirty="0" smtClean="0"/>
+              <a:t>électrique</a:t>
+            </a:r>
+            <a:endParaRPr lang="fr-FR" sz="1600" dirty="0" smtClean="0"/>
           </a:p>
           <a:p>
             <a:r>
@@ -5321,7 +5398,6 @@
               <a:rPr lang="fr-FR" sz="1600" dirty="0" smtClean="0"/>
               <a:t>Domaine de la mécanique</a:t>
             </a:r>
-            <a:endParaRPr lang="fr-FR" sz="1600" dirty="0" smtClean="0"/>
           </a:p>
         </p:txBody>
       </p:sp>
@@ -5422,19 +5498,19 @@
     </p:spTree>
     <p:extLst>
       <p:ext uri="{BB962C8B-B14F-4D97-AF65-F5344CB8AC3E}">
-        <p14:creationId xmlns:p14="http://schemas.microsoft.com/office/powerpoint/2010/main" val="479222456"/>
+        <p14:creationId xmlns:p14="http://schemas.microsoft.com/office/powerpoint/2010/main" xmlns="" val="479222456"/>
       </p:ext>
     </p:extLst>
   </p:cSld>
   <p:clrMapOvr>
     <a:masterClrMapping/>
   </p:clrMapOvr>
-  <mc:AlternateContent xmlns:mc="http://schemas.openxmlformats.org/markup-compatibility/2006" xmlns:p14="http://schemas.microsoft.com/office/powerpoint/2010/main">
-    <mc:Choice Requires="p14">
+  <mc:AlternateContent xmlns:mc="http://schemas.openxmlformats.org/markup-compatibility/2006">
+    <mc:Choice xmlns:p14="http://schemas.microsoft.com/office/powerpoint/2010/main" xmlns="" Requires="p14">
       <p:transition spd="slow" p14:dur="2000"/>
     </mc:Choice>
-    <mc:Fallback xmlns="">
-      <p:transition xmlns:p14="http://schemas.microsoft.com/office/powerpoint/2010/main" spd="slow"/>
+    <mc:Fallback>
+      <p:transition spd="slow"/>
     </mc:Fallback>
   </mc:AlternateContent>
   <p:timing>
@@ -5481,7 +5557,15 @@
           <a:p>
             <a:r>
               <a:rPr lang="fr-FR" dirty="0" smtClean="0"/>
-              <a:t>Scilab – XCOS </a:t>
+              <a:t>Scilab – </a:t>
+            </a:r>
+            <a:r>
+              <a:rPr lang="fr-FR" dirty="0" err="1" smtClean="0"/>
+              <a:t>Xcos</a:t>
+            </a:r>
+            <a:r>
+              <a:rPr lang="fr-FR" dirty="0" smtClean="0"/>
+              <a:t> </a:t>
             </a:r>
             <a:endParaRPr lang="fr-FR" dirty="0"/>
           </a:p>
@@ -5588,9 +5672,18 @@
           <a:lstStyle/>
           <a:p>
             <a:r>
+              <a:rPr lang="fr-FR" dirty="0" err="1" smtClean="0"/>
+              <a:t>Scilab</a:t>
+            </a:r>
+            <a:r>
               <a:rPr lang="fr-FR" dirty="0" smtClean="0"/>
-              <a:t>Scilab-XCOS</a:t>
-            </a:r>
+              <a:t>-</a:t>
+            </a:r>
+            <a:r>
+              <a:rPr lang="fr-FR" dirty="0" err="1" smtClean="0"/>
+              <a:t>Xcos</a:t>
+            </a:r>
+            <a:endParaRPr lang="fr-FR" dirty="0" smtClean="0"/>
           </a:p>
           <a:p>
             <a:pPr lvl="1"/>
@@ -5602,15 +5695,32 @@
           <a:p>
             <a:pPr lvl="1"/>
             <a:r>
+              <a:rPr lang="fr-FR" dirty="0" err="1" smtClean="0"/>
+              <a:t>Xcos</a:t>
+            </a:r>
+            <a:r>
               <a:rPr lang="fr-FR" dirty="0" smtClean="0"/>
-              <a:t>XCOS est un module permettant de modéliser un système par bloc. </a:t>
-            </a:r>
-          </a:p>
-          <a:p>
+              <a:t> </a:t>
+            </a:r>
             <a:r>
               <a:rPr lang="fr-FR" dirty="0" smtClean="0"/>
-              <a:t>Application destinée à la formation :</a:t>
-            </a:r>
+              <a:t>est un module permettant de modéliser un système par </a:t>
+            </a:r>
+            <a:r>
+              <a:rPr lang="fr-FR" dirty="0" smtClean="0"/>
+              <a:t>un bloc</a:t>
+            </a:r>
+            <a:r>
+              <a:rPr lang="fr-FR" dirty="0" smtClean="0"/>
+              <a:t>. </a:t>
+            </a:r>
+          </a:p>
+          <a:p>
+            <a:r>
+              <a:rPr lang="fr-FR" dirty="0" smtClean="0"/>
+              <a:t>Initiation :</a:t>
+            </a:r>
+            <a:endParaRPr lang="fr-FR" dirty="0" smtClean="0"/>
           </a:p>
           <a:p>
             <a:pPr lvl="1"/>
@@ -5622,8 +5732,13 @@
           <a:p>
             <a:r>
               <a:rPr lang="fr-FR" dirty="0" smtClean="0"/>
-              <a:t>Applications pédagogiques proposées :</a:t>
-            </a:r>
+              <a:t>Applications pédagogiques </a:t>
+            </a:r>
+            <a:r>
+              <a:rPr lang="fr-FR" dirty="0" smtClean="0"/>
+              <a:t>:</a:t>
+            </a:r>
+            <a:endParaRPr lang="fr-FR" dirty="0" smtClean="0"/>
           </a:p>
           <a:p>
             <a:pPr lvl="1"/>
@@ -5664,8 +5779,13 @@
             <a:pPr lvl="1"/>
             <a:r>
               <a:rPr lang="fr-FR" dirty="0" smtClean="0"/>
-              <a:t>Portail TPSET</a:t>
-            </a:r>
+              <a:t>Portail </a:t>
+            </a:r>
+            <a:r>
+              <a:rPr lang="fr-FR" dirty="0" smtClean="0"/>
+              <a:t>SET</a:t>
+            </a:r>
+            <a:endParaRPr lang="fr-FR" dirty="0" smtClean="0"/>
           </a:p>
           <a:p>
             <a:pPr lvl="2"/>
@@ -5691,7 +5811,7 @@
           <a:blip r:embed="rId3">
             <a:extLst>
               <a:ext uri="{28A0092B-C50C-407E-A947-70E740481C1C}">
-                <a14:useLocalDpi xmlns:a14="http://schemas.microsoft.com/office/drawing/2010/main" val="0"/>
+                <a14:useLocalDpi xmlns:a14="http://schemas.microsoft.com/office/drawing/2010/main" xmlns="" val="0"/>
               </a:ext>
             </a:extLst>
           </a:blip>
@@ -5715,14 +5835,14 @@
           <a:effectLst/>
           <a:extLst>
             <a:ext uri="{909E8E84-426E-40DD-AFC4-6F175D3DCCD1}">
-              <a14:hiddenFill xmlns:a14="http://schemas.microsoft.com/office/drawing/2010/main">
+              <a14:hiddenFill xmlns:a14="http://schemas.microsoft.com/office/drawing/2010/main" xmlns="">
                 <a:solidFill>
                   <a:schemeClr val="accent1"/>
                 </a:solidFill>
               </a14:hiddenFill>
             </a:ext>
             <a:ext uri="{91240B29-F687-4F45-9708-019B960494DF}">
-              <a14:hiddenLine xmlns:a14="http://schemas.microsoft.com/office/drawing/2010/main" w="9525">
+              <a14:hiddenLine xmlns:a14="http://schemas.microsoft.com/office/drawing/2010/main" xmlns="" w="9525">
                 <a:solidFill>
                   <a:schemeClr val="tx1"/>
                 </a:solidFill>
@@ -5732,7 +5852,7 @@
               </a14:hiddenLine>
             </a:ext>
             <a:ext uri="{AF507438-7753-43E0-B8FC-AC1667EBCBE1}">
-              <a14:hiddenEffects xmlns:a14="http://schemas.microsoft.com/office/drawing/2010/main">
+              <a14:hiddenEffects xmlns:a14="http://schemas.microsoft.com/office/drawing/2010/main" xmlns="">
                 <a:effectLst>
                   <a:outerShdw dist="35921" dir="2700000" algn="ctr" rotWithShape="0">
                     <a:schemeClr val="bg2"/>
@@ -5753,7 +5873,7 @@
           <a:blip r:embed="rId4">
             <a:extLst>
               <a:ext uri="{28A0092B-C50C-407E-A947-70E740481C1C}">
-                <a14:useLocalDpi xmlns:a14="http://schemas.microsoft.com/office/drawing/2010/main" val="0"/>
+                <a14:useLocalDpi xmlns:a14="http://schemas.microsoft.com/office/drawing/2010/main" xmlns="" val="0"/>
               </a:ext>
             </a:extLst>
           </a:blip>
@@ -5776,7 +5896,7 @@
     </p:spTree>
     <p:extLst>
       <p:ext uri="{BB962C8B-B14F-4D97-AF65-F5344CB8AC3E}">
-        <p14:creationId xmlns:p14="http://schemas.microsoft.com/office/powerpoint/2010/main" val="2718835750"/>
+        <p14:creationId xmlns:p14="http://schemas.microsoft.com/office/powerpoint/2010/main" xmlns="" val="2718835750"/>
       </p:ext>
     </p:extLst>
   </p:cSld>
@@ -5844,7 +5964,7 @@
         </p:spPr>
         <p:txBody>
           <a:bodyPr>
-            <a:normAutofit fontScale="92500"/>
+            <a:normAutofit fontScale="92500" lnSpcReduction="10000"/>
           </a:bodyPr>
           <a:lstStyle/>
           <a:p>
@@ -5859,7 +5979,6 @@
               <a:rPr lang="fr-FR" dirty="0" smtClean="0"/>
               <a:t>Aucun prérequis n’est nécessaire</a:t>
             </a:r>
-            <a:endParaRPr lang="fr-FR" dirty="0" smtClean="0"/>
           </a:p>
           <a:p>
             <a:pPr lvl="1"/>
@@ -5875,7 +5994,6 @@
               <a:rPr lang="fr-FR" dirty="0" smtClean="0"/>
               <a:t> n’est nécessaire</a:t>
             </a:r>
-            <a:endParaRPr lang="fr-FR" dirty="0" smtClean="0"/>
           </a:p>
           <a:p>
             <a:r>
@@ -5884,11 +6002,28 @@
             </a:r>
             <a:r>
               <a:rPr lang="fr-FR" dirty="0" smtClean="0"/>
-              <a:t>logiciels </a:t>
+              <a:t>logiciels</a:t>
+            </a:r>
+          </a:p>
+          <a:p>
+            <a:pPr>
+              <a:buNone/>
+            </a:pPr>
+            <a:r>
+              <a:rPr lang="fr-FR" dirty="0" smtClean="0"/>
+              <a:t>	</a:t>
+            </a:r>
+            <a:r>
+              <a:rPr lang="fr-FR" dirty="0" smtClean="0"/>
+              <a:t>(</a:t>
             </a:r>
             <a:r>
               <a:rPr lang="fr-FR" sz="1600" b="1" dirty="0" smtClean="0"/>
-              <a:t>(dans le cas où le professeur voudrait assister à la formation avec son ordinateur personnel)</a:t>
+              <a:t>dans </a:t>
+            </a:r>
+            <a:r>
+              <a:rPr lang="fr-FR" sz="1600" b="1" dirty="0" smtClean="0"/>
+              <a:t>le cas où le professeur voudrait assister à la formation avec son ordinateur personnel)</a:t>
             </a:r>
             <a:endParaRPr lang="fr-FR" b="1" dirty="0" smtClean="0"/>
           </a:p>
@@ -5910,31 +6045,37 @@
             <a:pPr lvl="3"/>
             <a:r>
               <a:rPr lang="fr-FR" dirty="0" smtClean="0"/>
-              <a:t>Compilateur C (installable avec </a:t>
-            </a:r>
-            <a:r>
-              <a:rPr lang="fr-FR" dirty="0" err="1" smtClean="0"/>
-              <a:t>xcos</a:t>
+              <a:t>Compilateur </a:t>
             </a:r>
             <a:r>
               <a:rPr lang="fr-FR" dirty="0" smtClean="0"/>
-              <a:t> sur les ordinateurs en 32 bits)</a:t>
-            </a:r>
+              <a:t>C</a:t>
+            </a:r>
+            <a:endParaRPr lang="fr-FR" dirty="0" smtClean="0"/>
           </a:p>
           <a:p>
             <a:pPr lvl="3"/>
             <a:r>
               <a:rPr lang="fr-FR" dirty="0" smtClean="0"/>
-              <a:t>Modules CPGE et SIMM</a:t>
-            </a:r>
-          </a:p>
-          <a:p>
-            <a:pPr lvl="3"/>
+              <a:t>Modules CPGE et </a:t>
+            </a:r>
             <a:r>
               <a:rPr lang="fr-FR" dirty="0" smtClean="0"/>
-              <a:t>Pour vérifier que l’installation est fonctionnelle, s’adresser aux formateurs avant la formation. </a:t>
-            </a:r>
-            <a:endParaRPr lang="fr-FR" dirty="0" smtClean="0"/>
+              <a:t>SIMM</a:t>
+            </a:r>
+          </a:p>
+          <a:p>
+            <a:pPr lvl="3">
+              <a:buNone/>
+            </a:pPr>
+            <a:r>
+              <a:rPr lang="fr-FR" b="1" dirty="0" smtClean="0"/>
+              <a:t>Pour </a:t>
+            </a:r>
+            <a:r>
+              <a:rPr lang="fr-FR" b="1" dirty="0" smtClean="0"/>
+              <a:t>vérifier que l’installation est fonctionnelle, s’adresser aux formateurs avant la formation. </a:t>
+            </a:r>
           </a:p>
           <a:p>
             <a:pPr lvl="1"/>
@@ -6016,7 +6157,7 @@
     </p:spTree>
     <p:extLst>
       <p:ext uri="{BB962C8B-B14F-4D97-AF65-F5344CB8AC3E}">
-        <p14:creationId xmlns:p14="http://schemas.microsoft.com/office/powerpoint/2010/main" val="2248875390"/>
+        <p14:creationId xmlns:p14="http://schemas.microsoft.com/office/powerpoint/2010/main" xmlns="" val="2248875390"/>
       </p:ext>
     </p:extLst>
   </p:cSld>

</xml_diff>